<commit_message>
update edit net src
</commit_message>
<xml_diff>
--- a/document/架构图.pptx
+++ b/document/架构图.pptx
@@ -6,6 +6,8 @@
   </p:sldMasterIdLst>
   <p:sldIdLst>
     <p:sldId id="256" r:id="rId2"/>
+    <p:sldId id="257" r:id="rId3"/>
+    <p:sldId id="258" r:id="rId4"/>
   </p:sldIdLst>
   <p:sldSz cx="12192000" cy="6858000"/>
   <p:notesSz cx="6858000" cy="9144000"/>
@@ -104,6 +106,11 @@
       </a:defRPr>
     </a:lvl9pPr>
   </p:defaultTextStyle>
+  <p:extLst>
+    <p:ext uri="{EFAFB233-063F-42B5-8137-9DF3F51BA10A}">
+      <p15:sldGuideLst xmlns:p15="http://schemas.microsoft.com/office/powerpoint/2012/main"/>
+    </p:ext>
+  </p:extLst>
 </p:presentation>
 </file>
 
@@ -238,7 +245,7 @@
           <a:p>
             <a:fld id="{F342358B-D085-4A89-8E09-3F6DADA30701}" type="datetimeFigureOut">
               <a:rPr lang="zh-CN" altLang="en-US" smtClean="0"/>
-              <a:t>2019/1/2</a:t>
+              <a:t>2019/1/6</a:t>
             </a:fld>
             <a:endParaRPr lang="zh-CN" altLang="en-US"/>
           </a:p>
@@ -408,7 +415,7 @@
           <a:p>
             <a:fld id="{F342358B-D085-4A89-8E09-3F6DADA30701}" type="datetimeFigureOut">
               <a:rPr lang="zh-CN" altLang="en-US" smtClean="0"/>
-              <a:t>2019/1/2</a:t>
+              <a:t>2019/1/6</a:t>
             </a:fld>
             <a:endParaRPr lang="zh-CN" altLang="en-US"/>
           </a:p>
@@ -588,7 +595,7 @@
           <a:p>
             <a:fld id="{F342358B-D085-4A89-8E09-3F6DADA30701}" type="datetimeFigureOut">
               <a:rPr lang="zh-CN" altLang="en-US" smtClean="0"/>
-              <a:t>2019/1/2</a:t>
+              <a:t>2019/1/6</a:t>
             </a:fld>
             <a:endParaRPr lang="zh-CN" altLang="en-US"/>
           </a:p>
@@ -758,7 +765,7 @@
           <a:p>
             <a:fld id="{F342358B-D085-4A89-8E09-3F6DADA30701}" type="datetimeFigureOut">
               <a:rPr lang="zh-CN" altLang="en-US" smtClean="0"/>
-              <a:t>2019/1/2</a:t>
+              <a:t>2019/1/6</a:t>
             </a:fld>
             <a:endParaRPr lang="zh-CN" altLang="en-US"/>
           </a:p>
@@ -1004,7 +1011,7 @@
           <a:p>
             <a:fld id="{F342358B-D085-4A89-8E09-3F6DADA30701}" type="datetimeFigureOut">
               <a:rPr lang="zh-CN" altLang="en-US" smtClean="0"/>
-              <a:t>2019/1/2</a:t>
+              <a:t>2019/1/6</a:t>
             </a:fld>
             <a:endParaRPr lang="zh-CN" altLang="en-US"/>
           </a:p>
@@ -1236,7 +1243,7 @@
           <a:p>
             <a:fld id="{F342358B-D085-4A89-8E09-3F6DADA30701}" type="datetimeFigureOut">
               <a:rPr lang="zh-CN" altLang="en-US" smtClean="0"/>
-              <a:t>2019/1/2</a:t>
+              <a:t>2019/1/6</a:t>
             </a:fld>
             <a:endParaRPr lang="zh-CN" altLang="en-US"/>
           </a:p>
@@ -1603,7 +1610,7 @@
           <a:p>
             <a:fld id="{F342358B-D085-4A89-8E09-3F6DADA30701}" type="datetimeFigureOut">
               <a:rPr lang="zh-CN" altLang="en-US" smtClean="0"/>
-              <a:t>2019/1/2</a:t>
+              <a:t>2019/1/6</a:t>
             </a:fld>
             <a:endParaRPr lang="zh-CN" altLang="en-US"/>
           </a:p>
@@ -1721,7 +1728,7 @@
           <a:p>
             <a:fld id="{F342358B-D085-4A89-8E09-3F6DADA30701}" type="datetimeFigureOut">
               <a:rPr lang="zh-CN" altLang="en-US" smtClean="0"/>
-              <a:t>2019/1/2</a:t>
+              <a:t>2019/1/6</a:t>
             </a:fld>
             <a:endParaRPr lang="zh-CN" altLang="en-US"/>
           </a:p>
@@ -1816,7 +1823,7 @@
           <a:p>
             <a:fld id="{F342358B-D085-4A89-8E09-3F6DADA30701}" type="datetimeFigureOut">
               <a:rPr lang="zh-CN" altLang="en-US" smtClean="0"/>
-              <a:t>2019/1/2</a:t>
+              <a:t>2019/1/6</a:t>
             </a:fld>
             <a:endParaRPr lang="zh-CN" altLang="en-US"/>
           </a:p>
@@ -2093,7 +2100,7 @@
           <a:p>
             <a:fld id="{F342358B-D085-4A89-8E09-3F6DADA30701}" type="datetimeFigureOut">
               <a:rPr lang="zh-CN" altLang="en-US" smtClean="0"/>
-              <a:t>2019/1/2</a:t>
+              <a:t>2019/1/6</a:t>
             </a:fld>
             <a:endParaRPr lang="zh-CN" altLang="en-US"/>
           </a:p>
@@ -2346,7 +2353,7 @@
           <a:p>
             <a:fld id="{F342358B-D085-4A89-8E09-3F6DADA30701}" type="datetimeFigureOut">
               <a:rPr lang="zh-CN" altLang="en-US" smtClean="0"/>
-              <a:t>2019/1/2</a:t>
+              <a:t>2019/1/6</a:t>
             </a:fld>
             <a:endParaRPr lang="zh-CN" altLang="en-US"/>
           </a:p>
@@ -2559,7 +2566,7 @@
           <a:p>
             <a:fld id="{F342358B-D085-4A89-8E09-3F6DADA30701}" type="datetimeFigureOut">
               <a:rPr lang="zh-CN" altLang="en-US" smtClean="0"/>
-              <a:t>2019/1/2</a:t>
+              <a:t>2019/1/6</a:t>
             </a:fld>
             <a:endParaRPr lang="zh-CN" altLang="en-US"/>
           </a:p>
@@ -3378,11 +3385,7 @@
             <a:pPr algn="ctr"/>
             <a:r>
               <a:rPr lang="en-US" altLang="zh-CN" dirty="0" smtClean="0"/>
-              <a:t>Game</a:t>
-            </a:r>
-            <a:r>
-              <a:rPr lang="en-US" altLang="zh-CN" dirty="0" smtClean="0"/>
-              <a:t>3</a:t>
+              <a:t>Game3</a:t>
             </a:r>
             <a:endParaRPr lang="zh-CN" altLang="en-US" dirty="0"/>
           </a:p>
@@ -3424,11 +3427,7 @@
             <a:pPr algn="ctr"/>
             <a:r>
               <a:rPr lang="en-US" altLang="zh-CN" dirty="0" smtClean="0"/>
-              <a:t>Game</a:t>
-            </a:r>
-            <a:r>
-              <a:rPr lang="en-US" altLang="zh-CN" dirty="0" smtClean="0"/>
-              <a:t>2</a:t>
+              <a:t>Game2</a:t>
             </a:r>
             <a:endParaRPr lang="zh-CN" altLang="en-US" dirty="0"/>
           </a:p>
@@ -4352,11 +4351,7 @@
             <a:pPr algn="ctr"/>
             <a:r>
               <a:rPr lang="en-US" altLang="zh-CN" dirty="0" smtClean="0"/>
-              <a:t>Game</a:t>
-            </a:r>
-            <a:r>
-              <a:rPr lang="en-US" altLang="zh-CN" dirty="0" smtClean="0"/>
-              <a:t>3</a:t>
+              <a:t>Game3</a:t>
             </a:r>
             <a:endParaRPr lang="zh-CN" altLang="en-US" dirty="0"/>
           </a:p>
@@ -4398,11 +4393,7 @@
             <a:pPr algn="ctr"/>
             <a:r>
               <a:rPr lang="en-US" altLang="zh-CN" dirty="0" smtClean="0"/>
-              <a:t>Game</a:t>
-            </a:r>
-            <a:r>
-              <a:rPr lang="en-US" altLang="zh-CN" dirty="0" smtClean="0"/>
-              <a:t>2</a:t>
+              <a:t>Game2</a:t>
             </a:r>
             <a:endParaRPr lang="zh-CN" altLang="en-US" dirty="0"/>
           </a:p>
@@ -5226,6 +5217,1778 @@
     <p:extLst>
       <p:ext uri="{BB962C8B-B14F-4D97-AF65-F5344CB8AC3E}">
         <p14:creationId xmlns:p14="http://schemas.microsoft.com/office/powerpoint/2010/main" val="1216053212"/>
+      </p:ext>
+    </p:extLst>
+  </p:cSld>
+  <p:clrMapOvr>
+    <a:masterClrMapping/>
+  </p:clrMapOvr>
+</p:sld>
+</file>
+
+<file path=ppt/slides/slide2.xml><?xml version="1.0" encoding="utf-8"?>
+<p:sld xmlns:a="http://schemas.openxmlformats.org/drawingml/2006/main" xmlns:r="http://schemas.openxmlformats.org/officeDocument/2006/relationships" xmlns:p="http://schemas.openxmlformats.org/presentationml/2006/main">
+  <p:cSld>
+    <p:spTree>
+      <p:nvGrpSpPr>
+        <p:cNvPr id="1" name=""/>
+        <p:cNvGrpSpPr/>
+        <p:nvPr/>
+      </p:nvGrpSpPr>
+      <p:grpSpPr>
+        <a:xfrm>
+          <a:off x="0" y="0"/>
+          <a:ext cx="0" cy="0"/>
+          <a:chOff x="0" y="0"/>
+          <a:chExt cx="0" cy="0"/>
+        </a:xfrm>
+      </p:grpSpPr>
+      <p:sp>
+        <p:nvSpPr>
+          <p:cNvPr id="4" name="矩形 3"/>
+          <p:cNvSpPr/>
+          <p:nvPr/>
+        </p:nvSpPr>
+        <p:spPr>
+          <a:xfrm>
+            <a:off x="0" y="0"/>
+            <a:ext cx="2097024" cy="280416"/>
+          </a:xfrm>
+          <a:prstGeom prst="rect">
+            <a:avLst/>
+          </a:prstGeom>
+        </p:spPr>
+        <p:style>
+          <a:lnRef idx="2">
+            <a:schemeClr val="accent1">
+              <a:shade val="50000"/>
+            </a:schemeClr>
+          </a:lnRef>
+          <a:fillRef idx="1">
+            <a:schemeClr val="accent1"/>
+          </a:fillRef>
+          <a:effectRef idx="0">
+            <a:schemeClr val="accent1"/>
+          </a:effectRef>
+          <a:fontRef idx="minor">
+            <a:schemeClr val="lt1"/>
+          </a:fontRef>
+        </p:style>
+        <p:txBody>
+          <a:bodyPr rtlCol="0" anchor="ctr"/>
+          <a:lstStyle/>
+          <a:p>
+            <a:pPr algn="ctr"/>
+            <a:r>
+              <a:rPr lang="zh-CN" altLang="en-US" sz="900" dirty="0" smtClean="0"/>
+              <a:t>测试消息流</a:t>
+            </a:r>
+            <a:endParaRPr lang="zh-CN" altLang="en-US" sz="900" dirty="0"/>
+          </a:p>
+        </p:txBody>
+      </p:sp>
+      <p:sp>
+        <p:nvSpPr>
+          <p:cNvPr id="5" name="矩形 4"/>
+          <p:cNvSpPr/>
+          <p:nvPr/>
+        </p:nvSpPr>
+        <p:spPr>
+          <a:xfrm>
+            <a:off x="1712976" y="1658112"/>
+            <a:ext cx="1127760" cy="603504"/>
+          </a:xfrm>
+          <a:prstGeom prst="rect">
+            <a:avLst/>
+          </a:prstGeom>
+        </p:spPr>
+        <p:style>
+          <a:lnRef idx="0">
+            <a:schemeClr val="accent6"/>
+          </a:lnRef>
+          <a:fillRef idx="3">
+            <a:schemeClr val="accent6"/>
+          </a:fillRef>
+          <a:effectRef idx="3">
+            <a:schemeClr val="accent6"/>
+          </a:effectRef>
+          <a:fontRef idx="minor">
+            <a:schemeClr val="lt1"/>
+          </a:fontRef>
+        </p:style>
+        <p:txBody>
+          <a:bodyPr rtlCol="0" anchor="ctr"/>
+          <a:lstStyle/>
+          <a:p>
+            <a:pPr algn="ctr"/>
+            <a:r>
+              <a:rPr lang="en-US" altLang="zh-CN" dirty="0" err="1" smtClean="0"/>
+              <a:t>Ts</a:t>
+            </a:r>
+            <a:endParaRPr lang="zh-CN" altLang="en-US" dirty="0"/>
+          </a:p>
+        </p:txBody>
+      </p:sp>
+      <p:sp>
+        <p:nvSpPr>
+          <p:cNvPr id="6" name="矩形 5"/>
+          <p:cNvSpPr/>
+          <p:nvPr/>
+        </p:nvSpPr>
+        <p:spPr>
+          <a:xfrm>
+            <a:off x="573024" y="301752"/>
+            <a:ext cx="1127760" cy="603504"/>
+          </a:xfrm>
+          <a:prstGeom prst="rect">
+            <a:avLst/>
+          </a:prstGeom>
+        </p:spPr>
+        <p:style>
+          <a:lnRef idx="1">
+            <a:schemeClr val="accent5"/>
+          </a:lnRef>
+          <a:fillRef idx="2">
+            <a:schemeClr val="accent5"/>
+          </a:fillRef>
+          <a:effectRef idx="1">
+            <a:schemeClr val="accent5"/>
+          </a:effectRef>
+          <a:fontRef idx="minor">
+            <a:schemeClr val="dk1"/>
+          </a:fontRef>
+        </p:style>
+        <p:txBody>
+          <a:bodyPr rtlCol="0" anchor="ctr"/>
+          <a:lstStyle/>
+          <a:p>
+            <a:pPr algn="ctr"/>
+            <a:r>
+              <a:rPr lang="en-US" altLang="zh-CN" dirty="0" smtClean="0"/>
+              <a:t>World1</a:t>
+            </a:r>
+            <a:endParaRPr lang="zh-CN" altLang="en-US" dirty="0"/>
+          </a:p>
+        </p:txBody>
+      </p:sp>
+      <p:sp>
+        <p:nvSpPr>
+          <p:cNvPr id="7" name="矩形 6"/>
+          <p:cNvSpPr/>
+          <p:nvPr/>
+        </p:nvSpPr>
+        <p:spPr>
+          <a:xfrm>
+            <a:off x="2849880" y="301752"/>
+            <a:ext cx="1127760" cy="603504"/>
+          </a:xfrm>
+          <a:prstGeom prst="rect">
+            <a:avLst/>
+          </a:prstGeom>
+        </p:spPr>
+        <p:style>
+          <a:lnRef idx="1">
+            <a:schemeClr val="accent5"/>
+          </a:lnRef>
+          <a:fillRef idx="2">
+            <a:schemeClr val="accent5"/>
+          </a:fillRef>
+          <a:effectRef idx="1">
+            <a:schemeClr val="accent5"/>
+          </a:effectRef>
+          <a:fontRef idx="minor">
+            <a:schemeClr val="dk1"/>
+          </a:fontRef>
+        </p:style>
+        <p:txBody>
+          <a:bodyPr rtlCol="0" anchor="ctr"/>
+          <a:lstStyle/>
+          <a:p>
+            <a:pPr algn="ctr"/>
+            <a:r>
+              <a:rPr lang="en-US" altLang="zh-CN" dirty="0" smtClean="0"/>
+              <a:t>World3</a:t>
+            </a:r>
+            <a:endParaRPr lang="zh-CN" altLang="en-US" dirty="0"/>
+          </a:p>
+        </p:txBody>
+      </p:sp>
+      <p:sp>
+        <p:nvSpPr>
+          <p:cNvPr id="8" name="矩形 7"/>
+          <p:cNvSpPr/>
+          <p:nvPr/>
+        </p:nvSpPr>
+        <p:spPr>
+          <a:xfrm>
+            <a:off x="1712976" y="301752"/>
+            <a:ext cx="1127760" cy="603504"/>
+          </a:xfrm>
+          <a:prstGeom prst="rect">
+            <a:avLst/>
+          </a:prstGeom>
+        </p:spPr>
+        <p:style>
+          <a:lnRef idx="1">
+            <a:schemeClr val="accent5"/>
+          </a:lnRef>
+          <a:fillRef idx="2">
+            <a:schemeClr val="accent5"/>
+          </a:fillRef>
+          <a:effectRef idx="1">
+            <a:schemeClr val="accent5"/>
+          </a:effectRef>
+          <a:fontRef idx="minor">
+            <a:schemeClr val="dk1"/>
+          </a:fontRef>
+        </p:style>
+        <p:txBody>
+          <a:bodyPr rtlCol="0" anchor="ctr"/>
+          <a:lstStyle/>
+          <a:p>
+            <a:pPr algn="ctr"/>
+            <a:r>
+              <a:rPr lang="en-US" altLang="zh-CN" dirty="0" smtClean="0"/>
+              <a:t>World2</a:t>
+            </a:r>
+            <a:endParaRPr lang="zh-CN" altLang="en-US" dirty="0"/>
+          </a:p>
+        </p:txBody>
+      </p:sp>
+      <p:sp>
+        <p:nvSpPr>
+          <p:cNvPr id="9" name="矩形 8"/>
+          <p:cNvSpPr/>
+          <p:nvPr/>
+        </p:nvSpPr>
+        <p:spPr>
+          <a:xfrm>
+            <a:off x="5163312" y="1002792"/>
+            <a:ext cx="1127760" cy="603504"/>
+          </a:xfrm>
+          <a:prstGeom prst="rect">
+            <a:avLst/>
+          </a:prstGeom>
+        </p:spPr>
+        <p:style>
+          <a:lnRef idx="3">
+            <a:schemeClr val="lt1"/>
+          </a:lnRef>
+          <a:fillRef idx="1">
+            <a:schemeClr val="accent4"/>
+          </a:fillRef>
+          <a:effectRef idx="1">
+            <a:schemeClr val="accent4"/>
+          </a:effectRef>
+          <a:fontRef idx="minor">
+            <a:schemeClr val="lt1"/>
+          </a:fontRef>
+        </p:style>
+        <p:txBody>
+          <a:bodyPr rtlCol="0" anchor="ctr"/>
+          <a:lstStyle/>
+          <a:p>
+            <a:pPr algn="ctr"/>
+            <a:r>
+              <a:rPr lang="en-US" altLang="zh-CN" dirty="0" err="1" smtClean="0"/>
+              <a:t>F_center</a:t>
+            </a:r>
+            <a:endParaRPr lang="zh-CN" altLang="en-US" dirty="0"/>
+          </a:p>
+        </p:txBody>
+      </p:sp>
+      <p:sp>
+        <p:nvSpPr>
+          <p:cNvPr id="10" name="矩形 9"/>
+          <p:cNvSpPr/>
+          <p:nvPr/>
+        </p:nvSpPr>
+        <p:spPr>
+          <a:xfrm>
+            <a:off x="6510528" y="399288"/>
+            <a:ext cx="1127760" cy="603504"/>
+          </a:xfrm>
+          <a:prstGeom prst="rect">
+            <a:avLst/>
+          </a:prstGeom>
+        </p:spPr>
+        <p:style>
+          <a:lnRef idx="1">
+            <a:schemeClr val="accent4"/>
+          </a:lnRef>
+          <a:fillRef idx="2">
+            <a:schemeClr val="accent4"/>
+          </a:fillRef>
+          <a:effectRef idx="1">
+            <a:schemeClr val="accent4"/>
+          </a:effectRef>
+          <a:fontRef idx="minor">
+            <a:schemeClr val="dk1"/>
+          </a:fontRef>
+        </p:style>
+        <p:txBody>
+          <a:bodyPr rtlCol="0" anchor="ctr"/>
+          <a:lstStyle/>
+          <a:p>
+            <a:pPr algn="ctr"/>
+            <a:r>
+              <a:rPr lang="en-US" altLang="zh-CN" dirty="0" smtClean="0"/>
+              <a:t>friend1</a:t>
+            </a:r>
+            <a:endParaRPr lang="zh-CN" altLang="en-US" dirty="0"/>
+          </a:p>
+        </p:txBody>
+      </p:sp>
+      <p:sp>
+        <p:nvSpPr>
+          <p:cNvPr id="11" name="矩形 10"/>
+          <p:cNvSpPr/>
+          <p:nvPr/>
+        </p:nvSpPr>
+        <p:spPr>
+          <a:xfrm>
+            <a:off x="6510528" y="1002792"/>
+            <a:ext cx="1127760" cy="603504"/>
+          </a:xfrm>
+          <a:prstGeom prst="rect">
+            <a:avLst/>
+          </a:prstGeom>
+        </p:spPr>
+        <p:style>
+          <a:lnRef idx="1">
+            <a:schemeClr val="accent4"/>
+          </a:lnRef>
+          <a:fillRef idx="2">
+            <a:schemeClr val="accent4"/>
+          </a:fillRef>
+          <a:effectRef idx="1">
+            <a:schemeClr val="accent4"/>
+          </a:effectRef>
+          <a:fontRef idx="minor">
+            <a:schemeClr val="dk1"/>
+          </a:fontRef>
+        </p:style>
+        <p:txBody>
+          <a:bodyPr rtlCol="0" anchor="ctr"/>
+          <a:lstStyle/>
+          <a:p>
+            <a:pPr algn="ctr"/>
+            <a:r>
+              <a:rPr lang="en-US" altLang="zh-CN" dirty="0" smtClean="0"/>
+              <a:t>friend2</a:t>
+            </a:r>
+            <a:endParaRPr lang="zh-CN" altLang="en-US" dirty="0"/>
+          </a:p>
+        </p:txBody>
+      </p:sp>
+      <p:sp>
+        <p:nvSpPr>
+          <p:cNvPr id="12" name="矩形 11"/>
+          <p:cNvSpPr/>
+          <p:nvPr/>
+        </p:nvSpPr>
+        <p:spPr>
+          <a:xfrm>
+            <a:off x="6510528" y="1606296"/>
+            <a:ext cx="1127760" cy="603504"/>
+          </a:xfrm>
+          <a:prstGeom prst="rect">
+            <a:avLst/>
+          </a:prstGeom>
+        </p:spPr>
+        <p:style>
+          <a:lnRef idx="1">
+            <a:schemeClr val="accent4"/>
+          </a:lnRef>
+          <a:fillRef idx="2">
+            <a:schemeClr val="accent4"/>
+          </a:fillRef>
+          <a:effectRef idx="1">
+            <a:schemeClr val="accent4"/>
+          </a:effectRef>
+          <a:fontRef idx="minor">
+            <a:schemeClr val="dk1"/>
+          </a:fontRef>
+        </p:style>
+        <p:txBody>
+          <a:bodyPr rtlCol="0" anchor="ctr"/>
+          <a:lstStyle/>
+          <a:p>
+            <a:pPr algn="ctr"/>
+            <a:r>
+              <a:rPr lang="en-US" altLang="zh-CN" dirty="0" smtClean="0"/>
+              <a:t>friend3</a:t>
+            </a:r>
+            <a:endParaRPr lang="zh-CN" altLang="en-US" dirty="0"/>
+          </a:p>
+        </p:txBody>
+      </p:sp>
+      <p:sp>
+        <p:nvSpPr>
+          <p:cNvPr id="13" name="矩形 12"/>
+          <p:cNvSpPr/>
+          <p:nvPr/>
+        </p:nvSpPr>
+        <p:spPr>
+          <a:xfrm>
+            <a:off x="573024" y="3014472"/>
+            <a:ext cx="1127760" cy="603504"/>
+          </a:xfrm>
+          <a:prstGeom prst="rect">
+            <a:avLst/>
+          </a:prstGeom>
+        </p:spPr>
+        <p:style>
+          <a:lnRef idx="1">
+            <a:schemeClr val="accent6"/>
+          </a:lnRef>
+          <a:fillRef idx="2">
+            <a:schemeClr val="accent6"/>
+          </a:fillRef>
+          <a:effectRef idx="1">
+            <a:schemeClr val="accent6"/>
+          </a:effectRef>
+          <a:fontRef idx="minor">
+            <a:schemeClr val="dk1"/>
+          </a:fontRef>
+        </p:style>
+        <p:txBody>
+          <a:bodyPr rtlCol="0" anchor="ctr"/>
+          <a:lstStyle/>
+          <a:p>
+            <a:pPr algn="ctr"/>
+            <a:r>
+              <a:rPr lang="en-US" altLang="zh-CN" dirty="0" smtClean="0"/>
+              <a:t>Game1</a:t>
+            </a:r>
+            <a:endParaRPr lang="zh-CN" altLang="en-US" dirty="0"/>
+          </a:p>
+        </p:txBody>
+      </p:sp>
+      <p:sp>
+        <p:nvSpPr>
+          <p:cNvPr id="14" name="矩形 13"/>
+          <p:cNvSpPr/>
+          <p:nvPr/>
+        </p:nvSpPr>
+        <p:spPr>
+          <a:xfrm>
+            <a:off x="2849880" y="3014472"/>
+            <a:ext cx="1127760" cy="603504"/>
+          </a:xfrm>
+          <a:prstGeom prst="rect">
+            <a:avLst/>
+          </a:prstGeom>
+        </p:spPr>
+        <p:style>
+          <a:lnRef idx="1">
+            <a:schemeClr val="accent6"/>
+          </a:lnRef>
+          <a:fillRef idx="2">
+            <a:schemeClr val="accent6"/>
+          </a:fillRef>
+          <a:effectRef idx="1">
+            <a:schemeClr val="accent6"/>
+          </a:effectRef>
+          <a:fontRef idx="minor">
+            <a:schemeClr val="dk1"/>
+          </a:fontRef>
+        </p:style>
+        <p:txBody>
+          <a:bodyPr rtlCol="0" anchor="ctr"/>
+          <a:lstStyle/>
+          <a:p>
+            <a:pPr algn="ctr"/>
+            <a:r>
+              <a:rPr lang="en-US" altLang="zh-CN" dirty="0" smtClean="0"/>
+              <a:t>Game3</a:t>
+            </a:r>
+            <a:endParaRPr lang="zh-CN" altLang="en-US" dirty="0"/>
+          </a:p>
+        </p:txBody>
+      </p:sp>
+      <p:sp>
+        <p:nvSpPr>
+          <p:cNvPr id="15" name="矩形 14"/>
+          <p:cNvSpPr/>
+          <p:nvPr/>
+        </p:nvSpPr>
+        <p:spPr>
+          <a:xfrm>
+            <a:off x="1712976" y="3014472"/>
+            <a:ext cx="1127760" cy="603504"/>
+          </a:xfrm>
+          <a:prstGeom prst="rect">
+            <a:avLst/>
+          </a:prstGeom>
+        </p:spPr>
+        <p:style>
+          <a:lnRef idx="1">
+            <a:schemeClr val="accent6"/>
+          </a:lnRef>
+          <a:fillRef idx="2">
+            <a:schemeClr val="accent6"/>
+          </a:fillRef>
+          <a:effectRef idx="1">
+            <a:schemeClr val="accent6"/>
+          </a:effectRef>
+          <a:fontRef idx="minor">
+            <a:schemeClr val="dk1"/>
+          </a:fontRef>
+        </p:style>
+        <p:txBody>
+          <a:bodyPr rtlCol="0" anchor="ctr"/>
+          <a:lstStyle/>
+          <a:p>
+            <a:pPr algn="ctr"/>
+            <a:r>
+              <a:rPr lang="en-US" altLang="zh-CN" dirty="0" smtClean="0"/>
+              <a:t>Game2</a:t>
+            </a:r>
+            <a:endParaRPr lang="zh-CN" altLang="en-US" dirty="0"/>
+          </a:p>
+        </p:txBody>
+      </p:sp>
+      <p:sp>
+        <p:nvSpPr>
+          <p:cNvPr id="16" name="矩形 15"/>
+          <p:cNvSpPr/>
+          <p:nvPr/>
+        </p:nvSpPr>
+        <p:spPr>
+          <a:xfrm>
+            <a:off x="5163312" y="3069336"/>
+            <a:ext cx="1127760" cy="603504"/>
+          </a:xfrm>
+          <a:prstGeom prst="rect">
+            <a:avLst/>
+          </a:prstGeom>
+        </p:spPr>
+        <p:style>
+          <a:lnRef idx="3">
+            <a:schemeClr val="lt1"/>
+          </a:lnRef>
+          <a:fillRef idx="1">
+            <a:schemeClr val="accent4"/>
+          </a:fillRef>
+          <a:effectRef idx="1">
+            <a:schemeClr val="accent4"/>
+          </a:effectRef>
+          <a:fontRef idx="minor">
+            <a:schemeClr val="lt1"/>
+          </a:fontRef>
+        </p:style>
+        <p:txBody>
+          <a:bodyPr rtlCol="0" anchor="ctr"/>
+          <a:lstStyle/>
+          <a:p>
+            <a:pPr algn="ctr"/>
+            <a:r>
+              <a:rPr lang="en-US" altLang="zh-CN" dirty="0" err="1" smtClean="0"/>
+              <a:t>F_alliance</a:t>
+            </a:r>
+            <a:endParaRPr lang="zh-CN" altLang="en-US" dirty="0"/>
+          </a:p>
+        </p:txBody>
+      </p:sp>
+      <p:sp>
+        <p:nvSpPr>
+          <p:cNvPr id="17" name="矩形 16"/>
+          <p:cNvSpPr/>
+          <p:nvPr/>
+        </p:nvSpPr>
+        <p:spPr>
+          <a:xfrm>
+            <a:off x="6510528" y="2465832"/>
+            <a:ext cx="1127760" cy="603504"/>
+          </a:xfrm>
+          <a:prstGeom prst="rect">
+            <a:avLst/>
+          </a:prstGeom>
+        </p:spPr>
+        <p:style>
+          <a:lnRef idx="1">
+            <a:schemeClr val="accent6"/>
+          </a:lnRef>
+          <a:fillRef idx="2">
+            <a:schemeClr val="accent6"/>
+          </a:fillRef>
+          <a:effectRef idx="1">
+            <a:schemeClr val="accent6"/>
+          </a:effectRef>
+          <a:fontRef idx="minor">
+            <a:schemeClr val="dk1"/>
+          </a:fontRef>
+        </p:style>
+        <p:txBody>
+          <a:bodyPr rtlCol="0" anchor="ctr"/>
+          <a:lstStyle/>
+          <a:p>
+            <a:pPr algn="ctr"/>
+            <a:r>
+              <a:rPr lang="en-US" altLang="zh-CN" dirty="0" smtClean="0"/>
+              <a:t>alliance1</a:t>
+            </a:r>
+            <a:endParaRPr lang="zh-CN" altLang="en-US" dirty="0"/>
+          </a:p>
+        </p:txBody>
+      </p:sp>
+      <p:sp>
+        <p:nvSpPr>
+          <p:cNvPr id="18" name="矩形 17"/>
+          <p:cNvSpPr/>
+          <p:nvPr/>
+        </p:nvSpPr>
+        <p:spPr>
+          <a:xfrm>
+            <a:off x="6510528" y="3069336"/>
+            <a:ext cx="1127760" cy="603504"/>
+          </a:xfrm>
+          <a:prstGeom prst="rect">
+            <a:avLst/>
+          </a:prstGeom>
+        </p:spPr>
+        <p:style>
+          <a:lnRef idx="1">
+            <a:schemeClr val="accent6"/>
+          </a:lnRef>
+          <a:fillRef idx="2">
+            <a:schemeClr val="accent6"/>
+          </a:fillRef>
+          <a:effectRef idx="1">
+            <a:schemeClr val="accent6"/>
+          </a:effectRef>
+          <a:fontRef idx="minor">
+            <a:schemeClr val="dk1"/>
+          </a:fontRef>
+        </p:style>
+        <p:txBody>
+          <a:bodyPr rtlCol="0" anchor="ctr"/>
+          <a:lstStyle/>
+          <a:p>
+            <a:pPr algn="ctr"/>
+            <a:r>
+              <a:rPr lang="en-US" altLang="zh-CN" dirty="0" smtClean="0"/>
+              <a:t>alliance2</a:t>
+            </a:r>
+            <a:endParaRPr lang="zh-CN" altLang="en-US" dirty="0"/>
+          </a:p>
+        </p:txBody>
+      </p:sp>
+      <p:sp>
+        <p:nvSpPr>
+          <p:cNvPr id="19" name="矩形 18"/>
+          <p:cNvSpPr/>
+          <p:nvPr/>
+        </p:nvSpPr>
+        <p:spPr>
+          <a:xfrm>
+            <a:off x="6510528" y="3672840"/>
+            <a:ext cx="1127760" cy="603504"/>
+          </a:xfrm>
+          <a:prstGeom prst="rect">
+            <a:avLst/>
+          </a:prstGeom>
+        </p:spPr>
+        <p:style>
+          <a:lnRef idx="1">
+            <a:schemeClr val="accent6"/>
+          </a:lnRef>
+          <a:fillRef idx="2">
+            <a:schemeClr val="accent6"/>
+          </a:fillRef>
+          <a:effectRef idx="1">
+            <a:schemeClr val="accent6"/>
+          </a:effectRef>
+          <a:fontRef idx="minor">
+            <a:schemeClr val="dk1"/>
+          </a:fontRef>
+        </p:style>
+        <p:txBody>
+          <a:bodyPr rtlCol="0" anchor="ctr"/>
+          <a:lstStyle/>
+          <a:p>
+            <a:pPr algn="ctr"/>
+            <a:r>
+              <a:rPr lang="en-US" altLang="zh-CN" dirty="0" smtClean="0"/>
+              <a:t>alliance3</a:t>
+            </a:r>
+            <a:endParaRPr lang="zh-CN" altLang="en-US" dirty="0"/>
+          </a:p>
+        </p:txBody>
+      </p:sp>
+      <p:cxnSp>
+        <p:nvCxnSpPr>
+          <p:cNvPr id="20" name="直接箭头连接符 19"/>
+          <p:cNvCxnSpPr>
+            <a:stCxn id="10" idx="1"/>
+            <a:endCxn id="9" idx="3"/>
+          </p:cNvCxnSpPr>
+          <p:nvPr/>
+        </p:nvCxnSpPr>
+        <p:spPr>
+          <a:xfrm flipH="1">
+            <a:off x="6291072" y="701040"/>
+            <a:ext cx="219456" cy="603504"/>
+          </a:xfrm>
+          <a:prstGeom prst="straightConnector1">
+            <a:avLst/>
+          </a:prstGeom>
+          <a:ln>
+            <a:tailEnd type="triangle"/>
+          </a:ln>
+        </p:spPr>
+        <p:style>
+          <a:lnRef idx="1">
+            <a:schemeClr val="accent1"/>
+          </a:lnRef>
+          <a:fillRef idx="0">
+            <a:schemeClr val="accent1"/>
+          </a:fillRef>
+          <a:effectRef idx="0">
+            <a:schemeClr val="accent1"/>
+          </a:effectRef>
+          <a:fontRef idx="minor">
+            <a:schemeClr val="tx1"/>
+          </a:fontRef>
+        </p:style>
+      </p:cxnSp>
+      <p:cxnSp>
+        <p:nvCxnSpPr>
+          <p:cNvPr id="21" name="直接箭头连接符 20"/>
+          <p:cNvCxnSpPr>
+            <a:stCxn id="12" idx="1"/>
+            <a:endCxn id="9" idx="3"/>
+          </p:cNvCxnSpPr>
+          <p:nvPr/>
+        </p:nvCxnSpPr>
+        <p:spPr>
+          <a:xfrm flipH="1" flipV="1">
+            <a:off x="6291072" y="1304544"/>
+            <a:ext cx="219456" cy="603504"/>
+          </a:xfrm>
+          <a:prstGeom prst="straightConnector1">
+            <a:avLst/>
+          </a:prstGeom>
+          <a:ln>
+            <a:tailEnd type="triangle"/>
+          </a:ln>
+        </p:spPr>
+        <p:style>
+          <a:lnRef idx="1">
+            <a:schemeClr val="accent1"/>
+          </a:lnRef>
+          <a:fillRef idx="0">
+            <a:schemeClr val="accent1"/>
+          </a:fillRef>
+          <a:effectRef idx="0">
+            <a:schemeClr val="accent1"/>
+          </a:effectRef>
+          <a:fontRef idx="minor">
+            <a:schemeClr val="tx1"/>
+          </a:fontRef>
+        </p:style>
+      </p:cxnSp>
+      <p:cxnSp>
+        <p:nvCxnSpPr>
+          <p:cNvPr id="22" name="直接箭头连接符 21"/>
+          <p:cNvCxnSpPr>
+            <a:stCxn id="11" idx="1"/>
+            <a:endCxn id="9" idx="3"/>
+          </p:cNvCxnSpPr>
+          <p:nvPr/>
+        </p:nvCxnSpPr>
+        <p:spPr>
+          <a:xfrm flipH="1">
+            <a:off x="6291072" y="1304544"/>
+            <a:ext cx="219456" cy="0"/>
+          </a:xfrm>
+          <a:prstGeom prst="straightConnector1">
+            <a:avLst/>
+          </a:prstGeom>
+          <a:ln>
+            <a:tailEnd type="triangle"/>
+          </a:ln>
+        </p:spPr>
+        <p:style>
+          <a:lnRef idx="3">
+            <a:schemeClr val="accent2"/>
+          </a:lnRef>
+          <a:fillRef idx="0">
+            <a:schemeClr val="accent2"/>
+          </a:fillRef>
+          <a:effectRef idx="2">
+            <a:schemeClr val="accent2"/>
+          </a:effectRef>
+          <a:fontRef idx="minor">
+            <a:schemeClr val="tx1"/>
+          </a:fontRef>
+        </p:style>
+      </p:cxnSp>
+      <p:cxnSp>
+        <p:nvCxnSpPr>
+          <p:cNvPr id="23" name="直接箭头连接符 22"/>
+          <p:cNvCxnSpPr>
+            <a:stCxn id="9" idx="1"/>
+            <a:endCxn id="5" idx="3"/>
+          </p:cNvCxnSpPr>
+          <p:nvPr/>
+        </p:nvCxnSpPr>
+        <p:spPr>
+          <a:xfrm flipH="1">
+            <a:off x="2840736" y="1304544"/>
+            <a:ext cx="2322576" cy="655320"/>
+          </a:xfrm>
+          <a:prstGeom prst="straightConnector1">
+            <a:avLst/>
+          </a:prstGeom>
+          <a:ln>
+            <a:tailEnd type="triangle"/>
+          </a:ln>
+        </p:spPr>
+        <p:style>
+          <a:lnRef idx="3">
+            <a:schemeClr val="accent2"/>
+          </a:lnRef>
+          <a:fillRef idx="0">
+            <a:schemeClr val="accent2"/>
+          </a:fillRef>
+          <a:effectRef idx="2">
+            <a:schemeClr val="accent2"/>
+          </a:effectRef>
+          <a:fontRef idx="minor">
+            <a:schemeClr val="tx1"/>
+          </a:fontRef>
+        </p:style>
+      </p:cxnSp>
+      <p:cxnSp>
+        <p:nvCxnSpPr>
+          <p:cNvPr id="24" name="直接箭头连接符 23"/>
+          <p:cNvCxnSpPr>
+            <a:stCxn id="19" idx="1"/>
+            <a:endCxn id="16" idx="3"/>
+          </p:cNvCxnSpPr>
+          <p:nvPr/>
+        </p:nvCxnSpPr>
+        <p:spPr>
+          <a:xfrm flipH="1" flipV="1">
+            <a:off x="6291072" y="3371088"/>
+            <a:ext cx="219456" cy="603504"/>
+          </a:xfrm>
+          <a:prstGeom prst="straightConnector1">
+            <a:avLst/>
+          </a:prstGeom>
+          <a:ln>
+            <a:tailEnd type="triangle"/>
+          </a:ln>
+        </p:spPr>
+        <p:style>
+          <a:lnRef idx="1">
+            <a:schemeClr val="accent1"/>
+          </a:lnRef>
+          <a:fillRef idx="0">
+            <a:schemeClr val="accent1"/>
+          </a:fillRef>
+          <a:effectRef idx="0">
+            <a:schemeClr val="accent1"/>
+          </a:effectRef>
+          <a:fontRef idx="minor">
+            <a:schemeClr val="tx1"/>
+          </a:fontRef>
+        </p:style>
+      </p:cxnSp>
+      <p:cxnSp>
+        <p:nvCxnSpPr>
+          <p:cNvPr id="25" name="直接箭头连接符 24"/>
+          <p:cNvCxnSpPr>
+            <a:stCxn id="18" idx="1"/>
+            <a:endCxn id="16" idx="3"/>
+          </p:cNvCxnSpPr>
+          <p:nvPr/>
+        </p:nvCxnSpPr>
+        <p:spPr>
+          <a:xfrm flipH="1">
+            <a:off x="6291072" y="3371088"/>
+            <a:ext cx="219456" cy="0"/>
+          </a:xfrm>
+          <a:prstGeom prst="straightConnector1">
+            <a:avLst/>
+          </a:prstGeom>
+          <a:ln>
+            <a:tailEnd type="triangle"/>
+          </a:ln>
+        </p:spPr>
+        <p:style>
+          <a:lnRef idx="1">
+            <a:schemeClr val="accent1"/>
+          </a:lnRef>
+          <a:fillRef idx="0">
+            <a:schemeClr val="accent1"/>
+          </a:fillRef>
+          <a:effectRef idx="0">
+            <a:schemeClr val="accent1"/>
+          </a:effectRef>
+          <a:fontRef idx="minor">
+            <a:schemeClr val="tx1"/>
+          </a:fontRef>
+        </p:style>
+      </p:cxnSp>
+      <p:cxnSp>
+        <p:nvCxnSpPr>
+          <p:cNvPr id="26" name="直接箭头连接符 25"/>
+          <p:cNvCxnSpPr>
+            <a:stCxn id="17" idx="1"/>
+            <a:endCxn id="16" idx="3"/>
+          </p:cNvCxnSpPr>
+          <p:nvPr/>
+        </p:nvCxnSpPr>
+        <p:spPr>
+          <a:xfrm flipH="1">
+            <a:off x="6291072" y="2767584"/>
+            <a:ext cx="219456" cy="603504"/>
+          </a:xfrm>
+          <a:prstGeom prst="straightConnector1">
+            <a:avLst/>
+          </a:prstGeom>
+          <a:ln>
+            <a:tailEnd type="triangle"/>
+          </a:ln>
+        </p:spPr>
+        <p:style>
+          <a:lnRef idx="1">
+            <a:schemeClr val="accent1"/>
+          </a:lnRef>
+          <a:fillRef idx="0">
+            <a:schemeClr val="accent1"/>
+          </a:fillRef>
+          <a:effectRef idx="0">
+            <a:schemeClr val="accent1"/>
+          </a:effectRef>
+          <a:fontRef idx="minor">
+            <a:schemeClr val="tx1"/>
+          </a:fontRef>
+        </p:style>
+      </p:cxnSp>
+      <p:cxnSp>
+        <p:nvCxnSpPr>
+          <p:cNvPr id="27" name="直接箭头连接符 26"/>
+          <p:cNvCxnSpPr>
+            <a:stCxn id="16" idx="1"/>
+            <a:endCxn id="5" idx="3"/>
+          </p:cNvCxnSpPr>
+          <p:nvPr/>
+        </p:nvCxnSpPr>
+        <p:spPr>
+          <a:xfrm flipH="1" flipV="1">
+            <a:off x="2840736" y="1959864"/>
+            <a:ext cx="2322576" cy="1411224"/>
+          </a:xfrm>
+          <a:prstGeom prst="straightConnector1">
+            <a:avLst/>
+          </a:prstGeom>
+          <a:ln>
+            <a:tailEnd type="triangle"/>
+          </a:ln>
+        </p:spPr>
+        <p:style>
+          <a:lnRef idx="1">
+            <a:schemeClr val="accent1"/>
+          </a:lnRef>
+          <a:fillRef idx="0">
+            <a:schemeClr val="accent1"/>
+          </a:fillRef>
+          <a:effectRef idx="0">
+            <a:schemeClr val="accent1"/>
+          </a:effectRef>
+          <a:fontRef idx="minor">
+            <a:schemeClr val="tx1"/>
+          </a:fontRef>
+        </p:style>
+      </p:cxnSp>
+      <p:cxnSp>
+        <p:nvCxnSpPr>
+          <p:cNvPr id="28" name="直接箭头连接符 27"/>
+          <p:cNvCxnSpPr>
+            <a:stCxn id="8" idx="2"/>
+            <a:endCxn id="5" idx="0"/>
+          </p:cNvCxnSpPr>
+          <p:nvPr/>
+        </p:nvCxnSpPr>
+        <p:spPr>
+          <a:xfrm>
+            <a:off x="2276856" y="905256"/>
+            <a:ext cx="0" cy="752856"/>
+          </a:xfrm>
+          <a:prstGeom prst="straightConnector1">
+            <a:avLst/>
+          </a:prstGeom>
+          <a:ln>
+            <a:tailEnd type="triangle"/>
+          </a:ln>
+        </p:spPr>
+        <p:style>
+          <a:lnRef idx="3">
+            <a:schemeClr val="accent2"/>
+          </a:lnRef>
+          <a:fillRef idx="0">
+            <a:schemeClr val="accent2"/>
+          </a:fillRef>
+          <a:effectRef idx="2">
+            <a:schemeClr val="accent2"/>
+          </a:effectRef>
+          <a:fontRef idx="minor">
+            <a:schemeClr val="tx1"/>
+          </a:fontRef>
+        </p:style>
+      </p:cxnSp>
+      <p:cxnSp>
+        <p:nvCxnSpPr>
+          <p:cNvPr id="29" name="直接箭头连接符 28"/>
+          <p:cNvCxnSpPr>
+            <a:stCxn id="6" idx="2"/>
+            <a:endCxn id="5" idx="0"/>
+          </p:cNvCxnSpPr>
+          <p:nvPr/>
+        </p:nvCxnSpPr>
+        <p:spPr>
+          <a:xfrm>
+            <a:off x="1136904" y="905256"/>
+            <a:ext cx="1139952" cy="752856"/>
+          </a:xfrm>
+          <a:prstGeom prst="straightConnector1">
+            <a:avLst/>
+          </a:prstGeom>
+          <a:ln>
+            <a:tailEnd type="triangle"/>
+          </a:ln>
+        </p:spPr>
+        <p:style>
+          <a:lnRef idx="1">
+            <a:schemeClr val="accent1"/>
+          </a:lnRef>
+          <a:fillRef idx="0">
+            <a:schemeClr val="accent1"/>
+          </a:fillRef>
+          <a:effectRef idx="0">
+            <a:schemeClr val="accent1"/>
+          </a:effectRef>
+          <a:fontRef idx="minor">
+            <a:schemeClr val="tx1"/>
+          </a:fontRef>
+        </p:style>
+      </p:cxnSp>
+      <p:cxnSp>
+        <p:nvCxnSpPr>
+          <p:cNvPr id="30" name="直接箭头连接符 29"/>
+          <p:cNvCxnSpPr>
+            <a:stCxn id="7" idx="2"/>
+            <a:endCxn id="5" idx="0"/>
+          </p:cNvCxnSpPr>
+          <p:nvPr/>
+        </p:nvCxnSpPr>
+        <p:spPr>
+          <a:xfrm flipH="1">
+            <a:off x="2276856" y="905256"/>
+            <a:ext cx="1136904" cy="752856"/>
+          </a:xfrm>
+          <a:prstGeom prst="straightConnector1">
+            <a:avLst/>
+          </a:prstGeom>
+          <a:ln>
+            <a:tailEnd type="triangle"/>
+          </a:ln>
+        </p:spPr>
+        <p:style>
+          <a:lnRef idx="1">
+            <a:schemeClr val="accent1"/>
+          </a:lnRef>
+          <a:fillRef idx="0">
+            <a:schemeClr val="accent1"/>
+          </a:fillRef>
+          <a:effectRef idx="0">
+            <a:schemeClr val="accent1"/>
+          </a:effectRef>
+          <a:fontRef idx="minor">
+            <a:schemeClr val="tx1"/>
+          </a:fontRef>
+        </p:style>
+      </p:cxnSp>
+      <p:cxnSp>
+        <p:nvCxnSpPr>
+          <p:cNvPr id="31" name="直接箭头连接符 30"/>
+          <p:cNvCxnSpPr>
+            <a:stCxn id="15" idx="0"/>
+            <a:endCxn id="5" idx="2"/>
+          </p:cNvCxnSpPr>
+          <p:nvPr/>
+        </p:nvCxnSpPr>
+        <p:spPr>
+          <a:xfrm flipV="1">
+            <a:off x="2276856" y="2261616"/>
+            <a:ext cx="0" cy="752856"/>
+          </a:xfrm>
+          <a:prstGeom prst="straightConnector1">
+            <a:avLst/>
+          </a:prstGeom>
+          <a:ln>
+            <a:tailEnd type="triangle"/>
+          </a:ln>
+        </p:spPr>
+        <p:style>
+          <a:lnRef idx="3">
+            <a:schemeClr val="accent4"/>
+          </a:lnRef>
+          <a:fillRef idx="0">
+            <a:schemeClr val="accent4"/>
+          </a:fillRef>
+          <a:effectRef idx="2">
+            <a:schemeClr val="accent4"/>
+          </a:effectRef>
+          <a:fontRef idx="minor">
+            <a:schemeClr val="tx1"/>
+          </a:fontRef>
+        </p:style>
+      </p:cxnSp>
+      <p:cxnSp>
+        <p:nvCxnSpPr>
+          <p:cNvPr id="32" name="直接箭头连接符 31"/>
+          <p:cNvCxnSpPr>
+            <a:stCxn id="14" idx="0"/>
+            <a:endCxn id="5" idx="2"/>
+          </p:cNvCxnSpPr>
+          <p:nvPr/>
+        </p:nvCxnSpPr>
+        <p:spPr>
+          <a:xfrm flipH="1" flipV="1">
+            <a:off x="2276856" y="2261616"/>
+            <a:ext cx="1136904" cy="752856"/>
+          </a:xfrm>
+          <a:prstGeom prst="straightConnector1">
+            <a:avLst/>
+          </a:prstGeom>
+          <a:ln>
+            <a:tailEnd type="triangle"/>
+          </a:ln>
+        </p:spPr>
+        <p:style>
+          <a:lnRef idx="1">
+            <a:schemeClr val="accent1"/>
+          </a:lnRef>
+          <a:fillRef idx="0">
+            <a:schemeClr val="accent1"/>
+          </a:fillRef>
+          <a:effectRef idx="0">
+            <a:schemeClr val="accent1"/>
+          </a:effectRef>
+          <a:fontRef idx="minor">
+            <a:schemeClr val="tx1"/>
+          </a:fontRef>
+        </p:style>
+      </p:cxnSp>
+      <p:cxnSp>
+        <p:nvCxnSpPr>
+          <p:cNvPr id="33" name="直接箭头连接符 32"/>
+          <p:cNvCxnSpPr>
+            <a:stCxn id="13" idx="0"/>
+            <a:endCxn id="5" idx="2"/>
+          </p:cNvCxnSpPr>
+          <p:nvPr/>
+        </p:nvCxnSpPr>
+        <p:spPr>
+          <a:xfrm flipV="1">
+            <a:off x="1136904" y="2261616"/>
+            <a:ext cx="1139952" cy="752856"/>
+          </a:xfrm>
+          <a:prstGeom prst="straightConnector1">
+            <a:avLst/>
+          </a:prstGeom>
+          <a:ln>
+            <a:tailEnd type="triangle"/>
+          </a:ln>
+        </p:spPr>
+        <p:style>
+          <a:lnRef idx="1">
+            <a:schemeClr val="accent1"/>
+          </a:lnRef>
+          <a:fillRef idx="0">
+            <a:schemeClr val="accent1"/>
+          </a:fillRef>
+          <a:effectRef idx="0">
+            <a:schemeClr val="accent1"/>
+          </a:effectRef>
+          <a:fontRef idx="minor">
+            <a:schemeClr val="tx1"/>
+          </a:fontRef>
+        </p:style>
+      </p:cxnSp>
+      <p:sp>
+        <p:nvSpPr>
+          <p:cNvPr id="49" name="椭圆 48"/>
+          <p:cNvSpPr/>
+          <p:nvPr/>
+        </p:nvSpPr>
+        <p:spPr>
+          <a:xfrm>
+            <a:off x="9110472" y="5181600"/>
+            <a:ext cx="1210056" cy="914400"/>
+          </a:xfrm>
+          <a:prstGeom prst="ellipse">
+            <a:avLst/>
+          </a:prstGeom>
+        </p:spPr>
+        <p:style>
+          <a:lnRef idx="2">
+            <a:schemeClr val="accent1">
+              <a:shade val="50000"/>
+            </a:schemeClr>
+          </a:lnRef>
+          <a:fillRef idx="1">
+            <a:schemeClr val="accent1"/>
+          </a:fillRef>
+          <a:effectRef idx="0">
+            <a:schemeClr val="accent1"/>
+          </a:effectRef>
+          <a:fontRef idx="minor">
+            <a:schemeClr val="lt1"/>
+          </a:fontRef>
+        </p:style>
+        <p:txBody>
+          <a:bodyPr rtlCol="0" anchor="ctr"/>
+          <a:lstStyle/>
+          <a:p>
+            <a:pPr algn="ctr"/>
+            <a:r>
+              <a:rPr lang="en-US" altLang="zh-CN" dirty="0" smtClean="0"/>
+              <a:t>Client</a:t>
+            </a:r>
+            <a:endParaRPr lang="zh-CN" altLang="en-US" dirty="0"/>
+          </a:p>
+        </p:txBody>
+      </p:sp>
+      <p:sp>
+        <p:nvSpPr>
+          <p:cNvPr id="50" name="矩形 49"/>
+          <p:cNvSpPr/>
+          <p:nvPr/>
+        </p:nvSpPr>
+        <p:spPr>
+          <a:xfrm>
+            <a:off x="1429512" y="4925568"/>
+            <a:ext cx="1694688" cy="914400"/>
+          </a:xfrm>
+          <a:prstGeom prst="rect">
+            <a:avLst/>
+          </a:prstGeom>
+        </p:spPr>
+        <p:style>
+          <a:lnRef idx="2">
+            <a:schemeClr val="accent1">
+              <a:shade val="50000"/>
+            </a:schemeClr>
+          </a:lnRef>
+          <a:fillRef idx="1">
+            <a:schemeClr val="accent1"/>
+          </a:fillRef>
+          <a:effectRef idx="0">
+            <a:schemeClr val="accent1"/>
+          </a:effectRef>
+          <a:fontRef idx="minor">
+            <a:schemeClr val="lt1"/>
+          </a:fontRef>
+        </p:style>
+        <p:txBody>
+          <a:bodyPr rtlCol="0" anchor="ctr"/>
+          <a:lstStyle/>
+          <a:p>
+            <a:pPr algn="ctr"/>
+            <a:r>
+              <a:rPr lang="en-US" altLang="zh-CN" dirty="0" smtClean="0"/>
+              <a:t>Login</a:t>
+            </a:r>
+            <a:endParaRPr lang="zh-CN" altLang="en-US" dirty="0"/>
+          </a:p>
+        </p:txBody>
+      </p:sp>
+      <p:cxnSp>
+        <p:nvCxnSpPr>
+          <p:cNvPr id="51" name="直接箭头连接符 50"/>
+          <p:cNvCxnSpPr>
+            <a:stCxn id="13" idx="2"/>
+            <a:endCxn id="50" idx="0"/>
+          </p:cNvCxnSpPr>
+          <p:nvPr/>
+        </p:nvCxnSpPr>
+        <p:spPr>
+          <a:xfrm>
+            <a:off x="1136904" y="3617976"/>
+            <a:ext cx="1139952" cy="1307592"/>
+          </a:xfrm>
+          <a:prstGeom prst="straightConnector1">
+            <a:avLst/>
+          </a:prstGeom>
+          <a:ln>
+            <a:tailEnd type="triangle"/>
+          </a:ln>
+        </p:spPr>
+        <p:style>
+          <a:lnRef idx="1">
+            <a:schemeClr val="accent1"/>
+          </a:lnRef>
+          <a:fillRef idx="0">
+            <a:schemeClr val="accent1"/>
+          </a:fillRef>
+          <a:effectRef idx="0">
+            <a:schemeClr val="accent1"/>
+          </a:effectRef>
+          <a:fontRef idx="minor">
+            <a:schemeClr val="tx1"/>
+          </a:fontRef>
+        </p:style>
+      </p:cxnSp>
+      <p:cxnSp>
+        <p:nvCxnSpPr>
+          <p:cNvPr id="52" name="直接箭头连接符 51"/>
+          <p:cNvCxnSpPr>
+            <a:stCxn id="14" idx="2"/>
+            <a:endCxn id="50" idx="0"/>
+          </p:cNvCxnSpPr>
+          <p:nvPr/>
+        </p:nvCxnSpPr>
+        <p:spPr>
+          <a:xfrm flipH="1">
+            <a:off x="2276856" y="3617976"/>
+            <a:ext cx="1136904" cy="1307592"/>
+          </a:xfrm>
+          <a:prstGeom prst="straightConnector1">
+            <a:avLst/>
+          </a:prstGeom>
+          <a:ln>
+            <a:tailEnd type="triangle"/>
+          </a:ln>
+        </p:spPr>
+        <p:style>
+          <a:lnRef idx="1">
+            <a:schemeClr val="accent1"/>
+          </a:lnRef>
+          <a:fillRef idx="0">
+            <a:schemeClr val="accent1"/>
+          </a:fillRef>
+          <a:effectRef idx="0">
+            <a:schemeClr val="accent1"/>
+          </a:effectRef>
+          <a:fontRef idx="minor">
+            <a:schemeClr val="tx1"/>
+          </a:fontRef>
+        </p:style>
+      </p:cxnSp>
+      <p:cxnSp>
+        <p:nvCxnSpPr>
+          <p:cNvPr id="53" name="直接箭头连接符 52"/>
+          <p:cNvCxnSpPr>
+            <a:stCxn id="15" idx="2"/>
+            <a:endCxn id="50" idx="0"/>
+          </p:cNvCxnSpPr>
+          <p:nvPr/>
+        </p:nvCxnSpPr>
+        <p:spPr>
+          <a:xfrm>
+            <a:off x="2276856" y="3617976"/>
+            <a:ext cx="0" cy="1307592"/>
+          </a:xfrm>
+          <a:prstGeom prst="straightConnector1">
+            <a:avLst/>
+          </a:prstGeom>
+          <a:ln>
+            <a:tailEnd type="triangle"/>
+          </a:ln>
+        </p:spPr>
+        <p:style>
+          <a:lnRef idx="3">
+            <a:schemeClr val="accent4"/>
+          </a:lnRef>
+          <a:fillRef idx="0">
+            <a:schemeClr val="accent4"/>
+          </a:fillRef>
+          <a:effectRef idx="2">
+            <a:schemeClr val="accent4"/>
+          </a:effectRef>
+          <a:fontRef idx="minor">
+            <a:schemeClr val="tx1"/>
+          </a:fontRef>
+        </p:style>
+      </p:cxnSp>
+      <p:cxnSp>
+        <p:nvCxnSpPr>
+          <p:cNvPr id="54" name="直接箭头连接符 53"/>
+          <p:cNvCxnSpPr>
+            <a:stCxn id="49" idx="2"/>
+            <a:endCxn id="50" idx="3"/>
+          </p:cNvCxnSpPr>
+          <p:nvPr/>
+        </p:nvCxnSpPr>
+        <p:spPr>
+          <a:xfrm flipH="1" flipV="1">
+            <a:off x="3124200" y="5382768"/>
+            <a:ext cx="5986272" cy="256032"/>
+          </a:xfrm>
+          <a:prstGeom prst="straightConnector1">
+            <a:avLst/>
+          </a:prstGeom>
+          <a:ln>
+            <a:tailEnd type="triangle"/>
+          </a:ln>
+        </p:spPr>
+        <p:style>
+          <a:lnRef idx="1">
+            <a:schemeClr val="accent1"/>
+          </a:lnRef>
+          <a:fillRef idx="0">
+            <a:schemeClr val="accent1"/>
+          </a:fillRef>
+          <a:effectRef idx="0">
+            <a:schemeClr val="accent1"/>
+          </a:effectRef>
+          <a:fontRef idx="minor">
+            <a:schemeClr val="tx1"/>
+          </a:fontRef>
+        </p:style>
+      </p:cxnSp>
+      <p:cxnSp>
+        <p:nvCxnSpPr>
+          <p:cNvPr id="55" name="直接箭头连接符 54"/>
+          <p:cNvCxnSpPr>
+            <a:stCxn id="49" idx="2"/>
+            <a:endCxn id="14" idx="2"/>
+          </p:cNvCxnSpPr>
+          <p:nvPr/>
+        </p:nvCxnSpPr>
+        <p:spPr>
+          <a:xfrm flipH="1" flipV="1">
+            <a:off x="3413760" y="3617976"/>
+            <a:ext cx="5696712" cy="2020824"/>
+          </a:xfrm>
+          <a:prstGeom prst="straightConnector1">
+            <a:avLst/>
+          </a:prstGeom>
+          <a:ln>
+            <a:tailEnd type="triangle"/>
+          </a:ln>
+        </p:spPr>
+        <p:style>
+          <a:lnRef idx="1">
+            <a:schemeClr val="accent1"/>
+          </a:lnRef>
+          <a:fillRef idx="0">
+            <a:schemeClr val="accent1"/>
+          </a:fillRef>
+          <a:effectRef idx="0">
+            <a:schemeClr val="accent1"/>
+          </a:effectRef>
+          <a:fontRef idx="minor">
+            <a:schemeClr val="tx1"/>
+          </a:fontRef>
+        </p:style>
+      </p:cxnSp>
+      <p:cxnSp>
+        <p:nvCxnSpPr>
+          <p:cNvPr id="56" name="直接箭头连接符 55"/>
+          <p:cNvCxnSpPr>
+            <a:stCxn id="49" idx="0"/>
+            <a:endCxn id="19" idx="3"/>
+          </p:cNvCxnSpPr>
+          <p:nvPr/>
+        </p:nvCxnSpPr>
+        <p:spPr>
+          <a:xfrm flipH="1" flipV="1">
+            <a:off x="7638288" y="3974592"/>
+            <a:ext cx="2077212" cy="1207008"/>
+          </a:xfrm>
+          <a:prstGeom prst="straightConnector1">
+            <a:avLst/>
+          </a:prstGeom>
+          <a:ln>
+            <a:tailEnd type="triangle"/>
+          </a:ln>
+        </p:spPr>
+        <p:style>
+          <a:lnRef idx="1">
+            <a:schemeClr val="accent1"/>
+          </a:lnRef>
+          <a:fillRef idx="0">
+            <a:schemeClr val="accent1"/>
+          </a:fillRef>
+          <a:effectRef idx="0">
+            <a:schemeClr val="accent1"/>
+          </a:effectRef>
+          <a:fontRef idx="minor">
+            <a:schemeClr val="tx1"/>
+          </a:fontRef>
+        </p:style>
+      </p:cxnSp>
+      <p:cxnSp>
+        <p:nvCxnSpPr>
+          <p:cNvPr id="57" name="直接箭头连接符 56"/>
+          <p:cNvCxnSpPr>
+            <a:stCxn id="49" idx="0"/>
+            <a:endCxn id="12" idx="3"/>
+          </p:cNvCxnSpPr>
+          <p:nvPr/>
+        </p:nvCxnSpPr>
+        <p:spPr>
+          <a:xfrm flipH="1" flipV="1">
+            <a:off x="7638288" y="1908048"/>
+            <a:ext cx="2077212" cy="3273552"/>
+          </a:xfrm>
+          <a:prstGeom prst="straightConnector1">
+            <a:avLst/>
+          </a:prstGeom>
+          <a:ln>
+            <a:tailEnd type="triangle"/>
+          </a:ln>
+        </p:spPr>
+        <p:style>
+          <a:lnRef idx="1">
+            <a:schemeClr val="accent1"/>
+          </a:lnRef>
+          <a:fillRef idx="0">
+            <a:schemeClr val="accent1"/>
+          </a:fillRef>
+          <a:effectRef idx="0">
+            <a:schemeClr val="accent1"/>
+          </a:effectRef>
+          <a:fontRef idx="minor">
+            <a:schemeClr val="tx1"/>
+          </a:fontRef>
+        </p:style>
+      </p:cxnSp>
+      <p:sp>
+        <p:nvSpPr>
+          <p:cNvPr id="58" name="圆角矩形 57"/>
+          <p:cNvSpPr/>
+          <p:nvPr/>
+        </p:nvSpPr>
+        <p:spPr>
+          <a:xfrm>
+            <a:off x="4293107" y="2045208"/>
+            <a:ext cx="1335024" cy="624840"/>
+          </a:xfrm>
+          <a:prstGeom prst="roundRect">
+            <a:avLst/>
+          </a:prstGeom>
+        </p:spPr>
+        <p:style>
+          <a:lnRef idx="0">
+            <a:schemeClr val="accent2"/>
+          </a:lnRef>
+          <a:fillRef idx="3">
+            <a:schemeClr val="accent2"/>
+          </a:fillRef>
+          <a:effectRef idx="3">
+            <a:schemeClr val="accent2"/>
+          </a:effectRef>
+          <a:fontRef idx="minor">
+            <a:schemeClr val="lt1"/>
+          </a:fontRef>
+        </p:style>
+        <p:txBody>
+          <a:bodyPr rtlCol="0" anchor="ctr"/>
+          <a:lstStyle/>
+          <a:p>
+            <a:pPr algn="ctr"/>
+            <a:r>
+              <a:rPr lang="en-US" altLang="zh-CN" dirty="0" err="1" smtClean="0"/>
+              <a:t>RegServer</a:t>
+            </a:r>
+            <a:endParaRPr lang="zh-CN" altLang="en-US" dirty="0"/>
+          </a:p>
+        </p:txBody>
+      </p:sp>
+      <p:cxnSp>
+        <p:nvCxnSpPr>
+          <p:cNvPr id="59" name="直接箭头连接符 58"/>
+          <p:cNvCxnSpPr>
+            <a:stCxn id="9" idx="2"/>
+            <a:endCxn id="58" idx="0"/>
+          </p:cNvCxnSpPr>
+          <p:nvPr/>
+        </p:nvCxnSpPr>
+        <p:spPr>
+          <a:xfrm flipH="1">
+            <a:off x="4960619" y="1606296"/>
+            <a:ext cx="766573" cy="438912"/>
+          </a:xfrm>
+          <a:prstGeom prst="straightConnector1">
+            <a:avLst/>
+          </a:prstGeom>
+          <a:ln>
+            <a:tailEnd type="triangle"/>
+          </a:ln>
+        </p:spPr>
+        <p:style>
+          <a:lnRef idx="1">
+            <a:schemeClr val="accent1"/>
+          </a:lnRef>
+          <a:fillRef idx="0">
+            <a:schemeClr val="accent1"/>
+          </a:fillRef>
+          <a:effectRef idx="0">
+            <a:schemeClr val="accent1"/>
+          </a:effectRef>
+          <a:fontRef idx="minor">
+            <a:schemeClr val="tx1"/>
+          </a:fontRef>
+        </p:style>
+      </p:cxnSp>
+      <p:cxnSp>
+        <p:nvCxnSpPr>
+          <p:cNvPr id="61" name="直接箭头连接符 60"/>
+          <p:cNvCxnSpPr>
+            <a:stCxn id="16" idx="0"/>
+            <a:endCxn id="58" idx="2"/>
+          </p:cNvCxnSpPr>
+          <p:nvPr/>
+        </p:nvCxnSpPr>
+        <p:spPr>
+          <a:xfrm flipH="1" flipV="1">
+            <a:off x="4960619" y="2670048"/>
+            <a:ext cx="766573" cy="399288"/>
+          </a:xfrm>
+          <a:prstGeom prst="straightConnector1">
+            <a:avLst/>
+          </a:prstGeom>
+          <a:ln>
+            <a:tailEnd type="triangle"/>
+          </a:ln>
+        </p:spPr>
+        <p:style>
+          <a:lnRef idx="1">
+            <a:schemeClr val="accent1"/>
+          </a:lnRef>
+          <a:fillRef idx="0">
+            <a:schemeClr val="accent1"/>
+          </a:fillRef>
+          <a:effectRef idx="0">
+            <a:schemeClr val="accent1"/>
+          </a:effectRef>
+          <a:fontRef idx="minor">
+            <a:schemeClr val="tx1"/>
+          </a:fontRef>
+        </p:style>
+      </p:cxnSp>
+      <p:cxnSp>
+        <p:nvCxnSpPr>
+          <p:cNvPr id="62" name="直接箭头连接符 61"/>
+          <p:cNvCxnSpPr>
+            <a:stCxn id="50" idx="0"/>
+            <a:endCxn id="58" idx="2"/>
+          </p:cNvCxnSpPr>
+          <p:nvPr/>
+        </p:nvCxnSpPr>
+        <p:spPr>
+          <a:xfrm flipV="1">
+            <a:off x="2276856" y="2670048"/>
+            <a:ext cx="2683763" cy="2255520"/>
+          </a:xfrm>
+          <a:prstGeom prst="straightConnector1">
+            <a:avLst/>
+          </a:prstGeom>
+          <a:ln>
+            <a:tailEnd type="triangle"/>
+          </a:ln>
+        </p:spPr>
+        <p:style>
+          <a:lnRef idx="1">
+            <a:schemeClr val="accent1"/>
+          </a:lnRef>
+          <a:fillRef idx="0">
+            <a:schemeClr val="accent1"/>
+          </a:fillRef>
+          <a:effectRef idx="0">
+            <a:schemeClr val="accent1"/>
+          </a:effectRef>
+          <a:fontRef idx="minor">
+            <a:schemeClr val="tx1"/>
+          </a:fontRef>
+        </p:style>
+      </p:cxnSp>
+    </p:spTree>
+    <p:extLst>
+      <p:ext uri="{BB962C8B-B14F-4D97-AF65-F5344CB8AC3E}">
+        <p14:creationId xmlns:p14="http://schemas.microsoft.com/office/powerpoint/2010/main" val="3717099814"/>
+      </p:ext>
+    </p:extLst>
+  </p:cSld>
+  <p:clrMapOvr>
+    <a:masterClrMapping/>
+  </p:clrMapOvr>
+</p:sld>
+</file>
+
+<file path=ppt/slides/slide3.xml><?xml version="1.0" encoding="utf-8"?>
+<p:sld xmlns:a="http://schemas.openxmlformats.org/drawingml/2006/main" xmlns:r="http://schemas.openxmlformats.org/officeDocument/2006/relationships" xmlns:p="http://schemas.openxmlformats.org/presentationml/2006/main">
+  <p:cSld>
+    <p:spTree>
+      <p:nvGrpSpPr>
+        <p:cNvPr id="1" name=""/>
+        <p:cNvGrpSpPr/>
+        <p:nvPr/>
+      </p:nvGrpSpPr>
+      <p:grpSpPr>
+        <a:xfrm>
+          <a:off x="0" y="0"/>
+          <a:ext cx="0" cy="0"/>
+          <a:chOff x="0" y="0"/>
+          <a:chExt cx="0" cy="0"/>
+        </a:xfrm>
+      </p:grpSpPr>
+      <p:sp>
+        <p:nvSpPr>
+          <p:cNvPr id="4" name="矩形 3"/>
+          <p:cNvSpPr/>
+          <p:nvPr/>
+        </p:nvSpPr>
+        <p:spPr>
+          <a:xfrm>
+            <a:off x="0" y="0"/>
+            <a:ext cx="2097024" cy="280416"/>
+          </a:xfrm>
+          <a:prstGeom prst="rect">
+            <a:avLst/>
+          </a:prstGeom>
+        </p:spPr>
+        <p:style>
+          <a:lnRef idx="2">
+            <a:schemeClr val="accent1">
+              <a:shade val="50000"/>
+            </a:schemeClr>
+          </a:lnRef>
+          <a:fillRef idx="1">
+            <a:schemeClr val="accent1"/>
+          </a:fillRef>
+          <a:effectRef idx="0">
+            <a:schemeClr val="accent1"/>
+          </a:effectRef>
+          <a:fontRef idx="minor">
+            <a:schemeClr val="lt1"/>
+          </a:fontRef>
+        </p:style>
+        <p:txBody>
+          <a:bodyPr rtlCol="0" anchor="ctr"/>
+          <a:lstStyle/>
+          <a:p>
+            <a:pPr algn="ctr"/>
+            <a:r>
+              <a:rPr lang="zh-CN" altLang="en-US" sz="900" dirty="0" smtClean="0"/>
+              <a:t>均衡负载管理</a:t>
+            </a:r>
+            <a:endParaRPr lang="zh-CN" altLang="en-US" sz="900" dirty="0"/>
+          </a:p>
+        </p:txBody>
+      </p:sp>
+    </p:spTree>
+    <p:extLst>
+      <p:ext uri="{BB962C8B-B14F-4D97-AF65-F5344CB8AC3E}">
+        <p14:creationId xmlns:p14="http://schemas.microsoft.com/office/powerpoint/2010/main" val="2210941806"/>
       </p:ext>
     </p:extLst>
   </p:cSld>

</xml_diff>